<commit_message>
update CommandUsae and tutorial for new type P3
</commit_message>
<xml_diff>
--- a/Meetings/Denver_2024/Denver-2024.pptx
+++ b/Meetings/Denver_2024/Denver-2024.pptx
@@ -101,7 +101,7 @@
         <p:txBody>
           <a:bodyPr/>
           <a:p>
-            <a:fld id="{4011805A-09BB-46DB-92CE-51A4CF84D554}" type="slidenum">
+            <a:fld id="{023D2A20-C7CD-4D80-AD77-AC92695A308A}" type="slidenum">
               <a:t>&lt;#&gt;</a:t>
             </a:fld>
           </a:p>
@@ -289,7 +289,7 @@
         <p:txBody>
           <a:bodyPr/>
           <a:p>
-            <a:fld id="{0768EC57-B875-4890-9BEC-957053AEB740}" type="slidenum">
+            <a:fld id="{0979BE4A-A48A-459A-8364-B6646D2DF00D}" type="slidenum">
               <a:t>&lt;#&gt;</a:t>
             </a:fld>
           </a:p>
@@ -545,7 +545,7 @@
         <p:txBody>
           <a:bodyPr/>
           <a:p>
-            <a:fld id="{237172DF-B0F8-471D-80BA-49870DE5C5BC}" type="slidenum">
+            <a:fld id="{683D2B3F-32FC-47C6-B129-A96F9301CEDA}" type="slidenum">
               <a:t>&lt;#&gt;</a:t>
             </a:fld>
           </a:p>
@@ -869,7 +869,7 @@
         <p:txBody>
           <a:bodyPr/>
           <a:p>
-            <a:fld id="{8CA25D55-8E0A-48A3-852C-8309A746F554}" type="slidenum">
+            <a:fld id="{D0BA2768-E7CB-4A6C-A9F9-ED0F1723DCE3}" type="slidenum">
               <a:t>&lt;#&gt;</a:t>
             </a:fld>
           </a:p>
@@ -952,7 +952,7 @@
         <p:txBody>
           <a:bodyPr/>
           <a:p>
-            <a:fld id="{781125A5-D1DC-4213-A15D-1D13CD6323F7}" type="slidenum">
+            <a:fld id="{8DA6E71A-FBD1-455A-AE3D-250EB57C7462}" type="slidenum">
               <a:t>&lt;#&gt;</a:t>
             </a:fld>
           </a:p>
@@ -1109,7 +1109,7 @@
         <p:txBody>
           <a:bodyPr/>
           <a:p>
-            <a:fld id="{B9B309F7-4E1A-4BD4-8953-6ED6FDE1B618}" type="slidenum">
+            <a:fld id="{97A369D0-5605-4BD5-B29F-0E50E0775607}" type="slidenum">
               <a:t>&lt;#&gt;</a:t>
             </a:fld>
           </a:p>
@@ -1263,7 +1263,7 @@
         <p:txBody>
           <a:bodyPr/>
           <a:p>
-            <a:fld id="{9DDC3CDB-A4BE-4819-BFAF-A12A477D1BCE}" type="slidenum">
+            <a:fld id="{ACF79918-E7FA-4D0F-9C44-C0322A899EED}" type="slidenum">
               <a:t>&lt;#&gt;</a:t>
             </a:fld>
           </a:p>
@@ -1451,7 +1451,7 @@
         <p:txBody>
           <a:bodyPr/>
           <a:p>
-            <a:fld id="{728ED180-BCE4-4255-856F-23CC2E2AE0CA}" type="slidenum">
+            <a:fld id="{F3B18914-5AE3-45B0-B1BA-FA071F33B1B4}" type="slidenum">
               <a:t>&lt;#&gt;</a:t>
             </a:fld>
           </a:p>
@@ -1571,7 +1571,7 @@
         <p:txBody>
           <a:bodyPr/>
           <a:p>
-            <a:fld id="{A18D1C5D-A958-49BA-BA44-5A902FF221BC}" type="slidenum">
+            <a:fld id="{92A82FB2-6EED-492C-B7A1-F5978325710D}" type="slidenum">
               <a:t>&lt;#&gt;</a:t>
             </a:fld>
           </a:p>
@@ -1691,7 +1691,7 @@
         <p:txBody>
           <a:bodyPr/>
           <a:p>
-            <a:fld id="{42C7BEA2-6CFC-4DA6-965F-3ADA9A41CDB6}" type="slidenum">
+            <a:fld id="{5238867E-98AE-48BE-A1E6-DF334A1A9FDD}" type="slidenum">
               <a:t>&lt;#&gt;</a:t>
             </a:fld>
           </a:p>
@@ -1913,7 +1913,7 @@
         <p:txBody>
           <a:bodyPr/>
           <a:p>
-            <a:fld id="{E11A5C3E-572B-4F02-BCAD-438BB496B91B}" type="slidenum">
+            <a:fld id="{C60A6010-DE31-44F3-82F5-0A623DE41E41}" type="slidenum">
               <a:t>&lt;#&gt;</a:t>
             </a:fld>
           </a:p>
@@ -2070,7 +2070,7 @@
         <p:txBody>
           <a:bodyPr/>
           <a:p>
-            <a:fld id="{582E4469-E132-4DFB-84FF-FBC6B4E990BD}" type="slidenum">
+            <a:fld id="{5F52C741-6888-4990-9AED-ED59C7CD9943}" type="slidenum">
               <a:t>&lt;#&gt;</a:t>
             </a:fld>
           </a:p>
@@ -2292,7 +2292,7 @@
         <p:txBody>
           <a:bodyPr/>
           <a:p>
-            <a:fld id="{FEAE848C-D2F8-4AFB-9043-C3775C2DE42D}" type="slidenum">
+            <a:fld id="{86DF6137-753F-4561-9FBC-1FA443FC33F3}" type="slidenum">
               <a:t>&lt;#&gt;</a:t>
             </a:fld>
           </a:p>
@@ -2514,7 +2514,7 @@
         <p:txBody>
           <a:bodyPr/>
           <a:p>
-            <a:fld id="{253A15E5-AA9D-4AAE-958B-49F63E8E407E}" type="slidenum">
+            <a:fld id="{76037AA5-8870-4E5A-8045-185A9F141451}" type="slidenum">
               <a:t>&lt;#&gt;</a:t>
             </a:fld>
           </a:p>
@@ -2702,7 +2702,7 @@
         <p:txBody>
           <a:bodyPr/>
           <a:p>
-            <a:fld id="{A247FD3B-8B02-43F8-8054-F2BB5C089EC0}" type="slidenum">
+            <a:fld id="{2C981447-0463-4FDA-960C-71792B2FE24D}" type="slidenum">
               <a:t>&lt;#&gt;</a:t>
             </a:fld>
           </a:p>
@@ -2958,7 +2958,7 @@
         <p:txBody>
           <a:bodyPr/>
           <a:p>
-            <a:fld id="{FB8C7B12-3E6F-4B2B-B569-0178DBB3E912}" type="slidenum">
+            <a:fld id="{EC98E00B-F0A2-47AF-8203-76CE7CA13732}" type="slidenum">
               <a:t>&lt;#&gt;</a:t>
             </a:fld>
           </a:p>
@@ -3282,7 +3282,7 @@
         <p:txBody>
           <a:bodyPr/>
           <a:p>
-            <a:fld id="{8B45FE62-34D9-4A97-BE5A-9B75903FAECD}" type="slidenum">
+            <a:fld id="{F357DD2C-D6E2-4721-8592-BD1B12EB1CCF}" type="slidenum">
               <a:t>&lt;#&gt;</a:t>
             </a:fld>
           </a:p>
@@ -3436,7 +3436,7 @@
         <p:txBody>
           <a:bodyPr/>
           <a:p>
-            <a:fld id="{76172A8D-2B4E-4F2A-AD28-ACE49D34B559}" type="slidenum">
+            <a:fld id="{ADC3A7CF-49BD-459A-A049-807F7586CC1C}" type="slidenum">
               <a:t>&lt;#&gt;</a:t>
             </a:fld>
           </a:p>
@@ -3624,7 +3624,7 @@
         <p:txBody>
           <a:bodyPr/>
           <a:p>
-            <a:fld id="{BC8891A8-989D-4DD9-8974-AC37F4411E9E}" type="slidenum">
+            <a:fld id="{BC1B9D06-E1DD-41E8-B74D-55B19FA47BF2}" type="slidenum">
               <a:t>&lt;#&gt;</a:t>
             </a:fld>
           </a:p>
@@ -3744,7 +3744,7 @@
         <p:txBody>
           <a:bodyPr/>
           <a:p>
-            <a:fld id="{2E602C42-CE1F-45B5-9A6D-AD83687FDF79}" type="slidenum">
+            <a:fld id="{61384526-9230-4B6D-9681-6D2DF2EAF3C5}" type="slidenum">
               <a:t>&lt;#&gt;</a:t>
             </a:fld>
           </a:p>
@@ -3864,7 +3864,7 @@
         <p:txBody>
           <a:bodyPr/>
           <a:p>
-            <a:fld id="{50F8434D-FFC9-4B0A-8320-8B49D92F0AA1}" type="slidenum">
+            <a:fld id="{3C9AFD35-2DD0-48B1-B329-65AE9A93C9D4}" type="slidenum">
               <a:t>&lt;#&gt;</a:t>
             </a:fld>
           </a:p>
@@ -4086,7 +4086,7 @@
         <p:txBody>
           <a:bodyPr/>
           <a:p>
-            <a:fld id="{E5907CA9-9150-4E5B-B607-11B4F14D41E4}" type="slidenum">
+            <a:fld id="{98654E30-44A6-4828-B3EB-0C795FC102CE}" type="slidenum">
               <a:t>&lt;#&gt;</a:t>
             </a:fld>
           </a:p>
@@ -4308,7 +4308,7 @@
         <p:txBody>
           <a:bodyPr/>
           <a:p>
-            <a:fld id="{E239905D-B25C-4DCC-9D14-B410854979D9}" type="slidenum">
+            <a:fld id="{2D6645A3-0D02-4500-85CD-907BC2256805}" type="slidenum">
               <a:t>&lt;#&gt;</a:t>
             </a:fld>
           </a:p>
@@ -4530,7 +4530,7 @@
         <p:txBody>
           <a:bodyPr/>
           <a:p>
-            <a:fld id="{FCF2FE3B-384A-4D2E-B59B-29973AD0B2A9}" type="slidenum">
+            <a:fld id="{72B81779-1598-40B9-A7C7-1BA9F28E3913}" type="slidenum">
               <a:t>&lt;#&gt;</a:t>
             </a:fld>
           </a:p>
@@ -4681,11 +4681,11 @@
               </a:lnSpc>
               <a:buNone/>
             </a:pPr>
-            <a:fld id="{70BCD473-FC1F-48E0-A007-8613409B735E}" type="slidenum">
+            <a:fld id="{87EC602C-3173-4555-BB74-BE98841FACF9}" type="slidenum">
               <a:rPr b="0" lang="en-US" sz="1400" spc="-1" strike="noStrike">
                 <a:latin typeface="Times New Roman"/>
               </a:rPr>
-              <a:t>31</a:t>
+              <a:t>16</a:t>
             </a:fld>
             <a:endParaRPr b="0" lang="en-US" sz="1400" spc="-1" strike="noStrike">
               <a:latin typeface="Times New Roman"/>
@@ -5105,7 +5105,7 @@
               </a:lnSpc>
               <a:buNone/>
             </a:pPr>
-            <a:fld id="{A46AEA4F-24CF-4D0D-A6C2-9229623AE907}" type="slidenum">
+            <a:fld id="{D919F0CF-901B-437A-8478-E469A398D503}" type="slidenum">
               <a:rPr b="0" lang="en-US" sz="1400" spc="-1" strike="noStrike">
                 <a:latin typeface="Times New Roman"/>
               </a:rPr>
@@ -5889,6 +5889,42 @@
           </a:p>
         </p:txBody>
       </p:sp>
+      <p:sp>
+        <p:nvSpPr>
+          <p:cNvPr id="106" name=""/>
+          <p:cNvSpPr txBox="1"/>
+          <p:nvPr/>
+        </p:nvSpPr>
+        <p:spPr>
+          <a:xfrm>
+            <a:off x="1371600" y="1371600"/>
+            <a:ext cx="4114800" cy="346320"/>
+          </a:xfrm>
+          <a:prstGeom prst="rect">
+            <a:avLst/>
+          </a:prstGeom>
+          <a:noFill/>
+          <a:ln w="0">
+            <a:noFill/>
+          </a:ln>
+        </p:spPr>
+        <p:txBody>
+          <a:bodyPr lIns="90000" rIns="90000" tIns="45000" bIns="45000" anchor="t">
+            <a:noAutofit/>
+          </a:bodyPr>
+          <a:p>
+            <a:r>
+              <a:rPr b="0" lang="en-US" sz="1800" spc="-1" strike="noStrike">
+                <a:latin typeface="Arial"/>
+              </a:rPr>
+              <a:t>LCA  delete slide</a:t>
+            </a:r>
+            <a:endParaRPr b="0" lang="en-US" sz="1800" spc="-1" strike="noStrike">
+              <a:latin typeface="Arial"/>
+            </a:endParaRPr>
+          </a:p>
+        </p:txBody>
+      </p:sp>
     </p:spTree>
   </p:cSld>
   <mc:AlternateContent>
@@ -5921,7 +5957,7 @@
       </p:grpSpPr>
       <p:sp>
         <p:nvSpPr>
-          <p:cNvPr id="106" name="PlaceHolder 1"/>
+          <p:cNvPr id="107" name="PlaceHolder 1"/>
           <p:cNvSpPr>
             <a:spLocks noGrp="1"/>
           </p:cNvSpPr>
@@ -5979,7 +6015,7 @@
       </p:sp>
       <p:sp>
         <p:nvSpPr>
-          <p:cNvPr id="107" name=""/>
+          <p:cNvPr id="108" name=""/>
           <p:cNvSpPr/>
           <p:nvPr/>
         </p:nvSpPr>
@@ -6052,7 +6088,7 @@
       </p:sp>
       <p:sp>
         <p:nvSpPr>
-          <p:cNvPr id="108" name=""/>
+          <p:cNvPr id="109" name=""/>
           <p:cNvSpPr txBox="1"/>
           <p:nvPr/>
         </p:nvSpPr>
@@ -6287,7 +6323,7 @@
       </p:grpSpPr>
       <p:sp>
         <p:nvSpPr>
-          <p:cNvPr id="109" name="PlaceHolder 1"/>
+          <p:cNvPr id="110" name="PlaceHolder 1"/>
           <p:cNvSpPr>
             <a:spLocks noGrp="1"/>
           </p:cNvSpPr>
@@ -6345,7 +6381,7 @@
       </p:sp>
       <p:sp>
         <p:nvSpPr>
-          <p:cNvPr id="110" name=""/>
+          <p:cNvPr id="111" name=""/>
           <p:cNvSpPr/>
           <p:nvPr/>
         </p:nvSpPr>
@@ -6371,7 +6407,7 @@
       </p:sp>
       <p:sp>
         <p:nvSpPr>
-          <p:cNvPr id="111" name=""/>
+          <p:cNvPr id="112" name=""/>
           <p:cNvSpPr txBox="1"/>
           <p:nvPr/>
         </p:nvSpPr>
@@ -6599,7 +6635,7 @@
       </p:grpSpPr>
       <p:sp>
         <p:nvSpPr>
-          <p:cNvPr id="112" name=""/>
+          <p:cNvPr id="113" name=""/>
           <p:cNvSpPr txBox="1"/>
           <p:nvPr/>
         </p:nvSpPr>
@@ -6693,7 +6729,7 @@
       </p:sp>
       <p:sp>
         <p:nvSpPr>
-          <p:cNvPr id="113" name=""/>
+          <p:cNvPr id="114" name=""/>
           <p:cNvSpPr txBox="1"/>
           <p:nvPr/>
         </p:nvSpPr>
@@ -6763,7 +6799,7 @@
       </p:sp>
       <p:sp>
         <p:nvSpPr>
-          <p:cNvPr id="114" name=""/>
+          <p:cNvPr id="115" name=""/>
           <p:cNvSpPr txBox="1"/>
           <p:nvPr/>
         </p:nvSpPr>
@@ -6976,7 +7012,7 @@
       </p:grpSpPr>
       <p:pic>
         <p:nvPicPr>
-          <p:cNvPr id="115" name="" descr=""/>
+          <p:cNvPr id="116" name="" descr=""/>
           <p:cNvPicPr/>
           <p:nvPr/>
         </p:nvPicPr>
@@ -6999,7 +7035,7 @@
       </p:pic>
       <p:pic>
         <p:nvPicPr>
-          <p:cNvPr id="116" name="" descr=""/>
+          <p:cNvPr id="117" name="" descr=""/>
           <p:cNvPicPr/>
           <p:nvPr/>
         </p:nvPicPr>
@@ -7022,19 +7058,21 @@
       </p:pic>
       <p:sp>
         <p:nvSpPr>
-          <p:cNvPr id="117" name=""/>
+          <p:cNvPr id="118" name=""/>
           <p:cNvSpPr txBox="1"/>
           <p:nvPr/>
         </p:nvSpPr>
         <p:spPr>
           <a:xfrm>
             <a:off x="-9720" y="21240"/>
-            <a:ext cx="10068120" cy="883080"/>
-          </a:xfrm>
-          <a:prstGeom prst="rect">
-            <a:avLst/>
-          </a:prstGeom>
-          <a:noFill/>
+            <a:ext cx="10068120" cy="664560"/>
+          </a:xfrm>
+          <a:prstGeom prst="rect">
+            <a:avLst/>
+          </a:prstGeom>
+          <a:solidFill>
+            <a:srgbClr val="ffffff"/>
+          </a:solidFill>
           <a:ln w="0">
             <a:noFill/>
           </a:ln>
@@ -7061,7 +7099,7 @@
       </p:sp>
       <p:pic>
         <p:nvPicPr>
-          <p:cNvPr id="118" name="" descr=""/>
+          <p:cNvPr id="119" name="" descr=""/>
           <p:cNvPicPr/>
           <p:nvPr/>
         </p:nvPicPr>
@@ -7114,7 +7152,7 @@
       </p:grpSpPr>
       <p:pic>
         <p:nvPicPr>
-          <p:cNvPr id="119" name="" descr=""/>
+          <p:cNvPr id="120" name="" descr=""/>
           <p:cNvPicPr/>
           <p:nvPr/>
         </p:nvPicPr>
@@ -7126,29 +7164,6 @@
           <a:xfrm>
             <a:off x="232920" y="1040760"/>
             <a:ext cx="9608760" cy="3580920"/>
-          </a:xfrm>
-          <a:prstGeom prst="rect">
-            <a:avLst/>
-          </a:prstGeom>
-          <a:ln w="0">
-            <a:noFill/>
-          </a:ln>
-        </p:spPr>
-      </p:pic>
-      <p:pic>
-        <p:nvPicPr>
-          <p:cNvPr id="120" name="" descr=""/>
-          <p:cNvPicPr/>
-          <p:nvPr/>
-        </p:nvPicPr>
-        <p:blipFill>
-          <a:blip r:embed="rId2"/>
-          <a:stretch/>
-        </p:blipFill>
-        <p:spPr>
-          <a:xfrm>
-            <a:off x="168120" y="1600200"/>
-            <a:ext cx="3718080" cy="2353680"/>
           </a:xfrm>
           <a:prstGeom prst="rect">
             <a:avLst/>
@@ -7165,6 +7180,29 @@
           <p:nvPr/>
         </p:nvPicPr>
         <p:blipFill>
+          <a:blip r:embed="rId2"/>
+          <a:stretch/>
+        </p:blipFill>
+        <p:spPr>
+          <a:xfrm>
+            <a:off x="168120" y="1600200"/>
+            <a:ext cx="3718080" cy="2353680"/>
+          </a:xfrm>
+          <a:prstGeom prst="rect">
+            <a:avLst/>
+          </a:prstGeom>
+          <a:ln w="0">
+            <a:noFill/>
+          </a:ln>
+        </p:spPr>
+      </p:pic>
+      <p:pic>
+        <p:nvPicPr>
+          <p:cNvPr id="122" name="" descr=""/>
+          <p:cNvPicPr/>
+          <p:nvPr/>
+        </p:nvPicPr>
+        <p:blipFill>
           <a:blip r:embed="rId3"/>
           <a:stretch/>
         </p:blipFill>
@@ -7183,7 +7221,7 @@
       </p:pic>
       <p:sp>
         <p:nvSpPr>
-          <p:cNvPr id="122" name=""/>
+          <p:cNvPr id="123" name=""/>
           <p:cNvSpPr txBox="1"/>
           <p:nvPr/>
         </p:nvSpPr>
@@ -7252,7 +7290,7 @@
       </p:grpSpPr>
       <p:sp>
         <p:nvSpPr>
-          <p:cNvPr id="123" name="PlaceHolder 1"/>
+          <p:cNvPr id="124" name="PlaceHolder 1"/>
           <p:cNvSpPr>
             <a:spLocks noGrp="1"/>
           </p:cNvSpPr>
@@ -7298,7 +7336,7 @@
       </p:sp>
       <p:sp>
         <p:nvSpPr>
-          <p:cNvPr id="124" name=""/>
+          <p:cNvPr id="125" name=""/>
           <p:cNvSpPr/>
           <p:nvPr/>
         </p:nvSpPr>
@@ -7495,7 +7533,7 @@
                 <a:latin typeface="Arial"/>
                 <a:ea typeface="Arial"/>
               </a:rPr>
-              <a:t> = a</a:t>
+              <a:t> = [a</a:t>
             </a:r>
             <a:r>
               <a:rPr b="0" lang="en-US" sz="2100" spc="-1" strike="noStrike" baseline="33000">
@@ -7615,7 +7653,7 @@
                 <a:latin typeface="Arial"/>
                 <a:ea typeface="Arial"/>
               </a:rPr>
-              <a:t>b</a:t>
+              <a:t>b]</a:t>
             </a:r>
             <a:endParaRPr b="0" lang="en-US" sz="2100" spc="-1" strike="noStrike">
               <a:latin typeface="Arial"/>
@@ -7628,6 +7666,42 @@
               </a:lnSpc>
               <a:buNone/>
             </a:pPr>
+            <a:endParaRPr b="0" lang="en-US" sz="1800" spc="-1" strike="noStrike">
+              <a:latin typeface="Arial"/>
+            </a:endParaRPr>
+          </a:p>
+        </p:txBody>
+      </p:sp>
+      <p:sp>
+        <p:nvSpPr>
+          <p:cNvPr id="126" name=""/>
+          <p:cNvSpPr txBox="1"/>
+          <p:nvPr/>
+        </p:nvSpPr>
+        <p:spPr>
+          <a:xfrm>
+            <a:off x="685800" y="1143000"/>
+            <a:ext cx="5257800" cy="346320"/>
+          </a:xfrm>
+          <a:prstGeom prst="rect">
+            <a:avLst/>
+          </a:prstGeom>
+          <a:noFill/>
+          <a:ln w="0">
+            <a:noFill/>
+          </a:ln>
+        </p:spPr>
+        <p:txBody>
+          <a:bodyPr lIns="90000" rIns="90000" tIns="45000" bIns="45000" anchor="t">
+            <a:noAutofit/>
+          </a:bodyPr>
+          <a:p>
+            <a:r>
+              <a:rPr b="0" lang="en-US" sz="1800" spc="-1" strike="noStrike">
+                <a:latin typeface="Arial"/>
+              </a:rPr>
+              <a:t>LCA  remove slide?</a:t>
+            </a:r>
             <a:endParaRPr b="0" lang="en-US" sz="1800" spc="-1" strike="noStrike">
               <a:latin typeface="Arial"/>
             </a:endParaRPr>
@@ -7666,7 +7740,7 @@
       </p:grpSpPr>
       <p:sp>
         <p:nvSpPr>
-          <p:cNvPr id="125" name="PlaceHolder 1"/>
+          <p:cNvPr id="127" name="PlaceHolder 1"/>
           <p:cNvSpPr>
             <a:spLocks noGrp="1"/>
           </p:cNvSpPr>
@@ -7721,7 +7795,7 @@
       </p:sp>
       <p:sp>
         <p:nvSpPr>
-          <p:cNvPr id="126" name=""/>
+          <p:cNvPr id="128" name=""/>
           <p:cNvSpPr/>
           <p:nvPr/>
         </p:nvSpPr>
@@ -7908,7 +7982,7 @@
                 <a:latin typeface="Arial"/>
                 <a:ea typeface="Arial"/>
               </a:rPr>
-              <a:t> = </a:t>
+              <a:t> = [</a:t>
             </a:r>
             <a:r>
               <a:rPr b="1" lang="en-US" sz="2100" spc="-1" strike="noStrike">
@@ -8109,6 +8183,16 @@
                 <a:ea typeface="Arial"/>
               </a:rPr>
               <a:t>b</a:t>
+            </a:r>
+            <a:r>
+              <a:rPr b="0" lang="en-US" sz="2100" spc="-1" strike="noStrike">
+                <a:solidFill>
+                  <a:srgbClr val="000000"/>
+                </a:solidFill>
+                <a:latin typeface="Arial"/>
+                <a:ea typeface="Arial"/>
+              </a:rPr>
+              <a:t>]</a:t>
             </a:r>
             <a:endParaRPr b="0" lang="en-US" sz="2100" spc="-1" strike="noStrike">
               <a:latin typeface="Arial"/>
@@ -8180,7 +8264,7 @@
       </p:grpSpPr>
       <p:sp>
         <p:nvSpPr>
-          <p:cNvPr id="127" name="PlaceHolder 1"/>
+          <p:cNvPr id="129" name="PlaceHolder 1"/>
           <p:cNvSpPr>
             <a:spLocks noGrp="1"/>
           </p:cNvSpPr>
@@ -8226,7 +8310,7 @@
       </p:sp>
       <p:pic>
         <p:nvPicPr>
-          <p:cNvPr id="128" name="" descr=""/>
+          <p:cNvPr id="130" name="" descr=""/>
           <p:cNvPicPr/>
           <p:nvPr/>
         </p:nvPicPr>
@@ -8249,7 +8333,7 @@
       </p:pic>
       <p:sp>
         <p:nvSpPr>
-          <p:cNvPr id="129" name=""/>
+          <p:cNvPr id="131" name=""/>
           <p:cNvSpPr/>
           <p:nvPr/>
         </p:nvSpPr>
@@ -8308,7 +8392,7 @@
       </p:grpSpPr>
       <p:sp>
         <p:nvSpPr>
-          <p:cNvPr id="130" name="PlaceHolder 1"/>
+          <p:cNvPr id="132" name="PlaceHolder 1"/>
           <p:cNvSpPr>
             <a:spLocks noGrp="1"/>
           </p:cNvSpPr>
@@ -8354,7 +8438,7 @@
       </p:sp>
       <p:pic>
         <p:nvPicPr>
-          <p:cNvPr id="131" name="" descr=""/>
+          <p:cNvPr id="133" name="" descr=""/>
           <p:cNvPicPr/>
           <p:nvPr/>
         </p:nvPicPr>
@@ -8377,7 +8461,7 @@
       </p:pic>
       <p:sp>
         <p:nvSpPr>
-          <p:cNvPr id="132" name=""/>
+          <p:cNvPr id="134" name=""/>
           <p:cNvSpPr txBox="1"/>
           <p:nvPr/>
         </p:nvSpPr>
@@ -8566,7 +8650,7 @@
       </p:grpSpPr>
       <p:sp>
         <p:nvSpPr>
-          <p:cNvPr id="133" name="PlaceHolder 1"/>
+          <p:cNvPr id="135" name="PlaceHolder 1"/>
           <p:cNvSpPr>
             <a:spLocks noGrp="1"/>
           </p:cNvSpPr>
@@ -8612,7 +8696,7 @@
       </p:sp>
       <p:sp>
         <p:nvSpPr>
-          <p:cNvPr id="134" name=""/>
+          <p:cNvPr id="136" name=""/>
           <p:cNvSpPr/>
           <p:nvPr/>
         </p:nvSpPr>
@@ -8685,7 +8769,7 @@
       </p:sp>
       <p:pic>
         <p:nvPicPr>
-          <p:cNvPr id="135" name="" descr=""/>
+          <p:cNvPr id="137" name="" descr=""/>
           <p:cNvPicPr/>
           <p:nvPr/>
         </p:nvPicPr>
@@ -8738,7 +8822,7 @@
       </p:grpSpPr>
       <p:sp>
         <p:nvSpPr>
-          <p:cNvPr id="136" name="PlaceHolder 1"/>
+          <p:cNvPr id="138" name="PlaceHolder 1"/>
           <p:cNvSpPr>
             <a:spLocks noGrp="1"/>
           </p:cNvSpPr>
@@ -8784,7 +8868,7 @@
       </p:sp>
       <p:pic>
         <p:nvPicPr>
-          <p:cNvPr id="137" name="" descr=""/>
+          <p:cNvPr id="139" name="" descr=""/>
           <p:cNvPicPr/>
           <p:nvPr/>
         </p:nvPicPr>
@@ -8807,7 +8891,7 @@
       </p:pic>
       <p:pic>
         <p:nvPicPr>
-          <p:cNvPr id="138" name="" descr=""/>
+          <p:cNvPr id="140" name="" descr=""/>
           <p:cNvPicPr/>
           <p:nvPr/>
         </p:nvPicPr>
@@ -8830,7 +8914,7 @@
       </p:pic>
       <p:sp>
         <p:nvSpPr>
-          <p:cNvPr id="139" name=""/>
+          <p:cNvPr id="141" name=""/>
           <p:cNvSpPr/>
           <p:nvPr/>
         </p:nvSpPr>
@@ -8908,7 +8992,7 @@
       </p:grpSpPr>
       <p:pic>
         <p:nvPicPr>
-          <p:cNvPr id="140" name="" descr=""/>
+          <p:cNvPr id="142" name="" descr=""/>
           <p:cNvPicPr/>
           <p:nvPr/>
         </p:nvPicPr>
@@ -8931,7 +9015,7 @@
       </p:pic>
       <p:sp>
         <p:nvSpPr>
-          <p:cNvPr id="141" name=""/>
+          <p:cNvPr id="143" name=""/>
           <p:cNvSpPr/>
           <p:nvPr/>
         </p:nvSpPr>
@@ -8983,7 +9067,7 @@
       </p:sp>
       <p:sp>
         <p:nvSpPr>
-          <p:cNvPr id="142" name=""/>
+          <p:cNvPr id="144" name=""/>
           <p:cNvSpPr/>
           <p:nvPr/>
         </p:nvSpPr>
@@ -9061,7 +9145,7 @@
       </p:grpSpPr>
       <p:sp>
         <p:nvSpPr>
-          <p:cNvPr id="143" name=""/>
+          <p:cNvPr id="145" name=""/>
           <p:cNvSpPr/>
           <p:nvPr/>
         </p:nvSpPr>
@@ -9109,7 +9193,7 @@
       </p:sp>
       <p:pic>
         <p:nvPicPr>
-          <p:cNvPr id="144" name="" descr=""/>
+          <p:cNvPr id="146" name="" descr=""/>
           <p:cNvPicPr/>
           <p:nvPr/>
         </p:nvPicPr>
@@ -9132,7 +9216,7 @@
       </p:pic>
       <p:sp>
         <p:nvSpPr>
-          <p:cNvPr id="145" name=""/>
+          <p:cNvPr id="147" name=""/>
           <p:cNvSpPr/>
           <p:nvPr/>
         </p:nvSpPr>
@@ -9197,7 +9281,7 @@
       </p:sp>
       <p:pic>
         <p:nvPicPr>
-          <p:cNvPr id="146" name="" descr=""/>
+          <p:cNvPr id="148" name="" descr=""/>
           <p:cNvPicPr/>
           <p:nvPr/>
         </p:nvPicPr>
@@ -9250,7 +9334,7 @@
       </p:grpSpPr>
       <p:sp>
         <p:nvSpPr>
-          <p:cNvPr id="147" name="PlaceHolder 1"/>
+          <p:cNvPr id="149" name="PlaceHolder 1"/>
           <p:cNvSpPr>
             <a:spLocks noGrp="1"/>
           </p:cNvSpPr>
@@ -9296,7 +9380,7 @@
       </p:sp>
       <p:sp>
         <p:nvSpPr>
-          <p:cNvPr id="148" name=""/>
+          <p:cNvPr id="150" name=""/>
           <p:cNvSpPr/>
           <p:nvPr/>
         </p:nvSpPr>
@@ -9362,7 +9446,7 @@
       </p:sp>
       <p:sp>
         <p:nvSpPr>
-          <p:cNvPr id="149" name=""/>
+          <p:cNvPr id="151" name=""/>
           <p:cNvSpPr/>
           <p:nvPr/>
         </p:nvSpPr>
@@ -9427,7 +9511,7 @@
       </p:sp>
       <p:sp>
         <p:nvSpPr>
-          <p:cNvPr id="150" name=""/>
+          <p:cNvPr id="152" name=""/>
           <p:cNvSpPr/>
           <p:nvPr/>
         </p:nvSpPr>
@@ -9523,7 +9607,7 @@
       </p:grpSpPr>
       <p:sp>
         <p:nvSpPr>
-          <p:cNvPr id="151" name="PlaceHolder 12"/>
+          <p:cNvPr id="153" name="PlaceHolder 12"/>
           <p:cNvSpPr/>
           <p:nvPr/>
         </p:nvSpPr>
@@ -9588,7 +9672,7 @@
       </p:sp>
       <p:pic>
         <p:nvPicPr>
-          <p:cNvPr id="152" name="" descr=""/>
+          <p:cNvPr id="154" name="" descr=""/>
           <p:cNvPicPr/>
           <p:nvPr/>
         </p:nvPicPr>
@@ -9611,7 +9695,7 @@
       </p:pic>
       <p:pic>
         <p:nvPicPr>
-          <p:cNvPr id="153" name="" descr=""/>
+          <p:cNvPr id="155" name="" descr=""/>
           <p:cNvPicPr/>
           <p:nvPr/>
         </p:nvPicPr>
@@ -9634,7 +9718,7 @@
       </p:pic>
       <p:grpSp>
         <p:nvGrpSpPr>
-          <p:cNvPr id="154" name=""/>
+          <p:cNvPr id="156" name=""/>
           <p:cNvGrpSpPr/>
           <p:nvPr/>
         </p:nvGrpSpPr>
@@ -9648,7 +9732,7 @@
         </p:grpSpPr>
         <p:pic>
           <p:nvPicPr>
-            <p:cNvPr id="155" name="" descr=""/>
+            <p:cNvPr id="157" name="" descr=""/>
             <p:cNvPicPr/>
             <p:nvPr/>
           </p:nvPicPr>
@@ -9671,7 +9755,7 @@
         </p:pic>
         <p:sp>
           <p:nvSpPr>
-            <p:cNvPr id="156" name=""/>
+            <p:cNvPr id="158" name=""/>
             <p:cNvSpPr/>
             <p:nvPr/>
           </p:nvSpPr>
@@ -9700,7 +9784,7 @@
         </p:sp>
         <p:sp>
           <p:nvSpPr>
-            <p:cNvPr id="157" name=""/>
+            <p:cNvPr id="159" name=""/>
             <p:cNvSpPr/>
             <p:nvPr/>
           </p:nvSpPr>
@@ -9760,7 +9844,7 @@
       </p:grpSpPr>
       <p:pic>
         <p:nvPicPr>
-          <p:cNvPr id="158" name="" descr=""/>
+          <p:cNvPr id="160" name="" descr=""/>
           <p:cNvPicPr/>
           <p:nvPr/>
         </p:nvPicPr>
@@ -9783,7 +9867,7 @@
       </p:pic>
       <p:pic>
         <p:nvPicPr>
-          <p:cNvPr id="159" name="" descr=""/>
+          <p:cNvPr id="161" name="" descr=""/>
           <p:cNvPicPr/>
           <p:nvPr/>
         </p:nvPicPr>
@@ -9806,7 +9890,7 @@
       </p:pic>
       <p:pic>
         <p:nvPicPr>
-          <p:cNvPr id="160" name="" descr=""/>
+          <p:cNvPr id="162" name="" descr=""/>
           <p:cNvPicPr/>
           <p:nvPr/>
         </p:nvPicPr>
@@ -9829,7 +9913,7 @@
       </p:pic>
       <p:sp>
         <p:nvSpPr>
-          <p:cNvPr id="161" name="PlaceHolder 13"/>
+          <p:cNvPr id="163" name="PlaceHolder 13"/>
           <p:cNvSpPr/>
           <p:nvPr/>
         </p:nvSpPr>
@@ -9877,7 +9961,7 @@
       </p:sp>
       <p:sp>
         <p:nvSpPr>
-          <p:cNvPr id="162" name=""/>
+          <p:cNvPr id="164" name=""/>
           <p:cNvSpPr txBox="1"/>
           <p:nvPr/>
         </p:nvSpPr>
@@ -9943,7 +10027,7 @@
       </p:grpSpPr>
       <p:pic>
         <p:nvPicPr>
-          <p:cNvPr id="163" name="" descr=""/>
+          <p:cNvPr id="165" name="" descr=""/>
           <p:cNvPicPr/>
           <p:nvPr/>
         </p:nvPicPr>
@@ -9966,7 +10050,7 @@
       </p:pic>
       <p:sp>
         <p:nvSpPr>
-          <p:cNvPr id="164" name="PlaceHolder 7"/>
+          <p:cNvPr id="166" name="PlaceHolder 7"/>
           <p:cNvSpPr/>
           <p:nvPr/>
         </p:nvSpPr>
@@ -10044,7 +10128,7 @@
       </p:grpSpPr>
       <p:sp>
         <p:nvSpPr>
-          <p:cNvPr id="165" name=""/>
+          <p:cNvPr id="167" name=""/>
           <p:cNvSpPr txBox="1"/>
           <p:nvPr/>
         </p:nvSpPr>
@@ -10098,7 +10182,7 @@
       </p:sp>
       <p:sp>
         <p:nvSpPr>
-          <p:cNvPr id="166" name=""/>
+          <p:cNvPr id="168" name=""/>
           <p:cNvSpPr txBox="1"/>
           <p:nvPr/>
         </p:nvSpPr>
@@ -10472,7 +10556,7 @@
       </p:grpSpPr>
       <p:sp>
         <p:nvSpPr>
-          <p:cNvPr id="167" name="PlaceHolder 1"/>
+          <p:cNvPr id="169" name="PlaceHolder 1"/>
           <p:cNvSpPr>
             <a:spLocks noGrp="1"/>
           </p:cNvSpPr>
@@ -10540,7 +10624,7 @@
       </p:sp>
       <p:pic>
         <p:nvPicPr>
-          <p:cNvPr id="168" name="" descr=""/>
+          <p:cNvPr id="170" name="" descr=""/>
           <p:cNvPicPr/>
           <p:nvPr/>
         </p:nvPicPr>
@@ -10563,7 +10647,7 @@
       </p:pic>
       <p:sp>
         <p:nvSpPr>
-          <p:cNvPr id="169" name=""/>
+          <p:cNvPr id="171" name=""/>
           <p:cNvSpPr txBox="1"/>
           <p:nvPr/>
         </p:nvSpPr>
@@ -10623,7 +10707,7 @@
       </p:sp>
       <p:sp>
         <p:nvSpPr>
-          <p:cNvPr id="170" name=""/>
+          <p:cNvPr id="172" name=""/>
           <p:cNvSpPr txBox="1"/>
           <p:nvPr/>
         </p:nvSpPr>
@@ -10794,7 +10878,7 @@
       </p:grpSpPr>
       <p:sp>
         <p:nvSpPr>
-          <p:cNvPr id="171" name="PlaceHolder 1"/>
+          <p:cNvPr id="173" name="PlaceHolder 1"/>
           <p:cNvSpPr>
             <a:spLocks noGrp="1"/>
           </p:cNvSpPr>
@@ -10830,7 +10914,7 @@
               <a:rPr b="1" lang="en-US" sz="2200" spc="-1" strike="noStrike">
                 <a:latin typeface="Arial"/>
               </a:rPr>
-              <a:t>Expanding shell around P 10 10 10 89 89 89,</a:t>
+              <a:t>Expanding shell around P 10 10 10 90 90 90,</a:t>
             </a:r>
             <a:br>
               <a:rPr sz="2200"/>
@@ -10855,7 +10939,7 @@
       </p:sp>
       <p:pic>
         <p:nvPicPr>
-          <p:cNvPr id="172" name="" descr=""/>
+          <p:cNvPr id="174" name="" descr=""/>
           <p:cNvPicPr/>
           <p:nvPr/>
         </p:nvPicPr>
@@ -10878,7 +10962,7 @@
       </p:pic>
       <p:sp>
         <p:nvSpPr>
-          <p:cNvPr id="173" name=""/>
+          <p:cNvPr id="175" name=""/>
           <p:cNvSpPr txBox="1"/>
           <p:nvPr/>
         </p:nvSpPr>
@@ -10944,7 +11028,7 @@
       </p:sp>
       <p:sp>
         <p:nvSpPr>
-          <p:cNvPr id="174" name=""/>
+          <p:cNvPr id="176" name=""/>
           <p:cNvSpPr txBox="1"/>
           <p:nvPr/>
         </p:nvSpPr>
@@ -11016,7 +11100,7 @@
       </p:grpSpPr>
       <p:sp>
         <p:nvSpPr>
-          <p:cNvPr id="175" name=""/>
+          <p:cNvPr id="177" name=""/>
           <p:cNvSpPr txBox="1"/>
           <p:nvPr/>
         </p:nvSpPr>
@@ -11082,7 +11166,7 @@
       </p:sp>
       <p:sp>
         <p:nvSpPr>
-          <p:cNvPr id="176" name=""/>
+          <p:cNvPr id="178" name=""/>
           <p:cNvSpPr txBox="1"/>
           <p:nvPr/>
         </p:nvSpPr>
@@ -11493,14 +11577,14 @@
       </p:grpSpPr>
       <p:sp>
         <p:nvSpPr>
-          <p:cNvPr id="177" name=""/>
+          <p:cNvPr id="179" name=""/>
           <p:cNvSpPr txBox="1"/>
           <p:nvPr/>
         </p:nvSpPr>
         <p:spPr>
           <a:xfrm>
-            <a:off x="457200" y="457200"/>
-            <a:ext cx="3200400" cy="1449720"/>
+            <a:off x="685800" y="457200"/>
+            <a:ext cx="5715000" cy="402840"/>
           </a:xfrm>
           <a:prstGeom prst="rect">
             <a:avLst/>
@@ -11516,35 +11600,10 @@
           </a:bodyPr>
           <a:p>
             <a:r>
-              <a:rPr b="1" lang="en-US" sz="2400" spc="-1" strike="noStrike">
-                <a:latin typeface="Arial"/>
-              </a:rPr>
-              <a:t>Example from Caroline Brock,</a:t>
-            </a:r>
-            <a:endParaRPr b="0" lang="en-US" sz="2400" spc="-1" strike="noStrike">
-              <a:latin typeface="Arial"/>
-            </a:endParaRPr>
-          </a:p>
-          <a:p>
-            <a:pPr>
-              <a:lnSpc>
-                <a:spcPct val="100000"/>
-              </a:lnSpc>
-              <a:buNone/>
-            </a:pPr>
-            <a:r>
-              <a:rPr b="1" lang="en-US" sz="2400" spc="-1" strike="noStrike">
-                <a:latin typeface="Arial"/>
-                <a:ea typeface="Microsoft YaHei"/>
-              </a:rPr>
-              <a:t>Plotted in</a:t>
-            </a:r>
-            <a:r>
-              <a:rPr b="0" lang="en-US" sz="1800" spc="-1" strike="noStrike">
-                <a:latin typeface="Arial"/>
-                <a:ea typeface="Microsoft YaHei"/>
-              </a:rPr>
-              <a:t> </a:t>
+              <a:rPr b="0" lang="en-US" sz="2200" spc="-1" strike="noStrike">
+                <a:latin typeface="Arial"/>
+              </a:rPr>
+              <a:t>2000 Random Cells in </a:t>
             </a:r>
             <a:r>
               <a:rPr b="1" lang="en-US" sz="2200" spc="-1" strike="noStrike">
@@ -11559,60 +11618,6 @@
               <a:t>3</a:t>
             </a:r>
             <a:endParaRPr b="0" lang="en-US" sz="2200" spc="-1" strike="noStrike">
-              <a:latin typeface="Arial"/>
-            </a:endParaRPr>
-          </a:p>
-          <a:p>
-            <a:pPr>
-              <a:lnSpc>
-                <a:spcPct val="100000"/>
-              </a:lnSpc>
-              <a:buNone/>
-            </a:pPr>
-            <a:r>
-              <a:rPr b="1" lang="en-US" sz="2400" spc="-1" strike="noStrike">
-                <a:latin typeface="Arial"/>
-                <a:ea typeface="Microsoft YaHei"/>
-              </a:rPr>
-              <a:t>1091 cells</a:t>
-            </a:r>
-            <a:endParaRPr b="0" lang="en-US" sz="2400" spc="-1" strike="noStrike">
-              <a:latin typeface="Arial"/>
-            </a:endParaRPr>
-          </a:p>
-        </p:txBody>
-      </p:sp>
-      <p:sp>
-        <p:nvSpPr>
-          <p:cNvPr id="178" name=""/>
-          <p:cNvSpPr txBox="1"/>
-          <p:nvPr/>
-        </p:nvSpPr>
-        <p:spPr>
-          <a:xfrm>
-            <a:off x="457200" y="4428720"/>
-            <a:ext cx="7315200" cy="1143000"/>
-          </a:xfrm>
-          <a:prstGeom prst="rect">
-            <a:avLst/>
-          </a:prstGeom>
-          <a:noFill/>
-          <a:ln w="0">
-            <a:noFill/>
-          </a:ln>
-        </p:spPr>
-        <p:txBody>
-          <a:bodyPr lIns="90000" rIns="90000" tIns="45000" bIns="45000" anchor="t">
-            <a:noAutofit/>
-          </a:bodyPr>
-          <a:p>
-            <a:r>
-              <a:rPr b="0" lang="en-US" sz="1600" spc="-1" strike="noStrike">
-                <a:latin typeface="Arial"/>
-              </a:rPr>
-              <a:t>Brock, Carolyn Pratt, and Robin Taylor. "Identifying and characterizing translationally modulated molecular crystal structures." Acta Crystallographica Section B: Structural Science, Crystal Engineering and Materials 76.4 (2020): 630-642.</a:t>
-            </a:r>
-            <a:endParaRPr b="0" lang="en-US" sz="1600" spc="-1" strike="noStrike">
               <a:latin typeface="Arial"/>
             </a:endParaRPr>
           </a:p>
@@ -11620,7 +11625,7 @@
       </p:sp>
       <p:pic>
         <p:nvPicPr>
-          <p:cNvPr id="179" name="" descr=""/>
+          <p:cNvPr id="180" name="" descr=""/>
           <p:cNvPicPr/>
           <p:nvPr/>
         </p:nvPicPr>
@@ -11630,8 +11635,8 @@
         </p:blipFill>
         <p:spPr>
           <a:xfrm>
-            <a:off x="3330360" y="457200"/>
-            <a:ext cx="6499440" cy="3971520"/>
+            <a:off x="1013400" y="968760"/>
+            <a:ext cx="7974360" cy="4555800"/>
           </a:xfrm>
           <a:prstGeom prst="rect">
             <a:avLst/>
@@ -11673,14 +11678,14 @@
       </p:grpSpPr>
       <p:sp>
         <p:nvSpPr>
-          <p:cNvPr id="180" name=""/>
+          <p:cNvPr id="181" name=""/>
           <p:cNvSpPr txBox="1"/>
           <p:nvPr/>
         </p:nvSpPr>
         <p:spPr>
           <a:xfrm>
-            <a:off x="457200" y="421200"/>
-            <a:ext cx="8686800" cy="1562400"/>
+            <a:off x="457200" y="457200"/>
+            <a:ext cx="3200400" cy="1449720"/>
           </a:xfrm>
           <a:prstGeom prst="rect">
             <a:avLst/>
@@ -11694,6 +11699,17 @@
           <a:bodyPr lIns="90000" rIns="90000" tIns="45000" bIns="45000" anchor="t">
             <a:noAutofit/>
           </a:bodyPr>
+          <a:p>
+            <a:r>
+              <a:rPr b="1" lang="en-US" sz="2400" spc="-1" strike="noStrike">
+                <a:latin typeface="Arial"/>
+              </a:rPr>
+              <a:t>Example from Caroline Brock,</a:t>
+            </a:r>
+            <a:endParaRPr b="0" lang="en-US" sz="2400" spc="-1" strike="noStrike">
+              <a:latin typeface="Arial"/>
+            </a:endParaRPr>
+          </a:p>
           <a:p>
             <a:pPr>
               <a:lnSpc>
@@ -11704,42 +11720,46 @@
             <a:r>
               <a:rPr b="1" lang="en-US" sz="2400" spc="-1" strike="noStrike">
                 <a:latin typeface="Arial"/>
-              </a:rPr>
-              <a:t>Example from Caroline Brock, </a:t>
-            </a:r>
+                <a:ea typeface="Microsoft YaHei"/>
+              </a:rPr>
+              <a:t>Plotted in</a:t>
+            </a:r>
+            <a:r>
+              <a:rPr b="0" lang="en-US" sz="1800" spc="-1" strike="noStrike">
+                <a:latin typeface="Arial"/>
+                <a:ea typeface="Microsoft YaHei"/>
+              </a:rPr>
+              <a:t> </a:t>
+            </a:r>
+            <a:r>
+              <a:rPr b="1" lang="en-US" sz="2200" spc="-1" strike="noStrike">
+                <a:latin typeface="Arial"/>
+              </a:rPr>
+              <a:t>P</a:t>
+            </a:r>
+            <a:r>
+              <a:rPr b="1" lang="en-US" sz="2200" spc="-1" strike="noStrike" baseline="33000">
+                <a:latin typeface="Arial"/>
+              </a:rPr>
+              <a:t>3</a:t>
+            </a:r>
+            <a:endParaRPr b="0" lang="en-US" sz="2200" spc="-1" strike="noStrike">
+              <a:latin typeface="Arial"/>
+            </a:endParaRPr>
+          </a:p>
+          <a:p>
+            <a:pPr>
+              <a:lnSpc>
+                <a:spcPct val="100000"/>
+              </a:lnSpc>
+              <a:buNone/>
+            </a:pPr>
             <a:r>
               <a:rPr b="1" lang="en-US" sz="2400" spc="-1" strike="noStrike">
                 <a:latin typeface="Arial"/>
                 <a:ea typeface="Microsoft YaHei"/>
               </a:rPr>
-              <a:t>Plotted in</a:t>
-            </a:r>
-            <a:r>
-              <a:rPr b="1" lang="en-US" sz="2400" spc="-1" strike="noStrike">
-                <a:latin typeface="Arial"/>
-                <a:ea typeface="Microsoft YaHei"/>
-              </a:rPr>
-              <a:t> </a:t>
-            </a:r>
-            <a:r>
-              <a:rPr b="1" lang="en-US" sz="2600" spc="-1" strike="noStrike">
-                <a:latin typeface="Arial"/>
-                <a:ea typeface="Microsoft YaHei"/>
-              </a:rPr>
-              <a:t>C</a:t>
-            </a:r>
-            <a:r>
-              <a:rPr b="1" lang="en-US" sz="3200" spc="-1" strike="noStrike" baseline="33000">
-                <a:latin typeface="Arial"/>
-              </a:rPr>
-              <a:t>3</a:t>
-            </a:r>
-            <a:r>
-              <a:rPr b="1" lang="en-US" sz="2400" spc="-1" strike="noStrike">
-                <a:latin typeface="Arial"/>
-                <a:ea typeface="Microsoft YaHei"/>
-              </a:rPr>
-              <a:t>, 1089 cells</a:t>
+              <a:t>1091 cells</a:t>
             </a:r>
             <a:endParaRPr b="0" lang="en-US" sz="2400" spc="-1" strike="noStrike">
               <a:latin typeface="Arial"/>
@@ -11749,7 +11769,7 @@
       </p:sp>
       <p:sp>
         <p:nvSpPr>
-          <p:cNvPr id="181" name=""/>
+          <p:cNvPr id="182" name=""/>
           <p:cNvSpPr txBox="1"/>
           <p:nvPr/>
         </p:nvSpPr>
@@ -11785,7 +11805,7 @@
       </p:sp>
       <p:pic>
         <p:nvPicPr>
-          <p:cNvPr id="182" name="" descr=""/>
+          <p:cNvPr id="183" name="" descr=""/>
           <p:cNvPicPr/>
           <p:nvPr/>
         </p:nvPicPr>
@@ -11795,8 +11815,8 @@
         </p:blipFill>
         <p:spPr>
           <a:xfrm>
-            <a:off x="605520" y="1137960"/>
-            <a:ext cx="8930880" cy="3093480"/>
+            <a:off x="3330360" y="457200"/>
+            <a:ext cx="6499440" cy="3971520"/>
           </a:xfrm>
           <a:prstGeom prst="rect">
             <a:avLst/>
@@ -11838,14 +11858,14 @@
       </p:grpSpPr>
       <p:sp>
         <p:nvSpPr>
-          <p:cNvPr id="183" name=""/>
+          <p:cNvPr id="184" name=""/>
           <p:cNvSpPr txBox="1"/>
           <p:nvPr/>
         </p:nvSpPr>
         <p:spPr>
           <a:xfrm>
-            <a:off x="685800" y="457200"/>
-            <a:ext cx="5715000" cy="402840"/>
+            <a:off x="457200" y="421200"/>
+            <a:ext cx="8686800" cy="1562400"/>
           </a:xfrm>
           <a:prstGeom prst="rect">
             <a:avLst/>
@@ -11860,25 +11880,89 @@
             <a:noAutofit/>
           </a:bodyPr>
           <a:p>
-            <a:r>
-              <a:rPr b="0" lang="en-US" sz="2200" spc="-1" strike="noStrike">
-                <a:latin typeface="Arial"/>
-              </a:rPr>
-              <a:t>2000 Random Cells in </a:t>
-            </a:r>
-            <a:r>
-              <a:rPr b="1" lang="en-US" sz="2200" spc="-1" strike="noStrike">
-                <a:latin typeface="Arial"/>
-              </a:rPr>
-              <a:t>P</a:t>
-            </a:r>
-            <a:r>
-              <a:rPr b="1" lang="en-US" sz="2200" spc="-1" strike="noStrike" baseline="33000">
+            <a:pPr>
+              <a:lnSpc>
+                <a:spcPct val="100000"/>
+              </a:lnSpc>
+              <a:buNone/>
+            </a:pPr>
+            <a:r>
+              <a:rPr b="1" lang="en-US" sz="2400" spc="-1" strike="noStrike">
+                <a:latin typeface="Arial"/>
+              </a:rPr>
+              <a:t>Example from Caroline Brock, </a:t>
+            </a:r>
+            <a:r>
+              <a:rPr b="1" lang="en-US" sz="2400" spc="-1" strike="noStrike">
+                <a:latin typeface="Arial"/>
+                <a:ea typeface="Microsoft YaHei"/>
+              </a:rPr>
+              <a:t>Plotted in</a:t>
+            </a:r>
+            <a:r>
+              <a:rPr b="1" lang="en-US" sz="2400" spc="-1" strike="noStrike">
+                <a:latin typeface="Arial"/>
+                <a:ea typeface="Microsoft YaHei"/>
+              </a:rPr>
+              <a:t> </a:t>
+            </a:r>
+            <a:r>
+              <a:rPr b="1" lang="en-US" sz="2600" spc="-1" strike="noStrike">
+                <a:latin typeface="Arial"/>
+                <a:ea typeface="Microsoft YaHei"/>
+              </a:rPr>
+              <a:t>C</a:t>
+            </a:r>
+            <a:r>
+              <a:rPr b="1" lang="en-US" sz="3200" spc="-1" strike="noStrike" baseline="33000">
                 <a:latin typeface="Arial"/>
               </a:rPr>
               <a:t>3</a:t>
             </a:r>
-            <a:endParaRPr b="0" lang="en-US" sz="2200" spc="-1" strike="noStrike">
+            <a:r>
+              <a:rPr b="1" lang="en-US" sz="2400" spc="-1" strike="noStrike">
+                <a:latin typeface="Arial"/>
+                <a:ea typeface="Microsoft YaHei"/>
+              </a:rPr>
+              <a:t>, 1089 cells</a:t>
+            </a:r>
+            <a:endParaRPr b="0" lang="en-US" sz="2400" spc="-1" strike="noStrike">
+              <a:latin typeface="Arial"/>
+            </a:endParaRPr>
+          </a:p>
+        </p:txBody>
+      </p:sp>
+      <p:sp>
+        <p:nvSpPr>
+          <p:cNvPr id="185" name=""/>
+          <p:cNvSpPr txBox="1"/>
+          <p:nvPr/>
+        </p:nvSpPr>
+        <p:spPr>
+          <a:xfrm>
+            <a:off x="457200" y="4428720"/>
+            <a:ext cx="7315200" cy="1143000"/>
+          </a:xfrm>
+          <a:prstGeom prst="rect">
+            <a:avLst/>
+          </a:prstGeom>
+          <a:noFill/>
+          <a:ln w="0">
+            <a:noFill/>
+          </a:ln>
+        </p:spPr>
+        <p:txBody>
+          <a:bodyPr lIns="90000" rIns="90000" tIns="45000" bIns="45000" anchor="t">
+            <a:noAutofit/>
+          </a:bodyPr>
+          <a:p>
+            <a:r>
+              <a:rPr b="0" lang="en-US" sz="1600" spc="-1" strike="noStrike">
+                <a:latin typeface="Arial"/>
+              </a:rPr>
+              <a:t>Brock, Carolyn Pratt, and Robin Taylor. "Identifying and characterizing translationally modulated molecular crystal structures." Acta Crystallographica Section B: Structural Science, Crystal Engineering and Materials 76.4 (2020): 630-642.</a:t>
+            </a:r>
+            <a:endParaRPr b="0" lang="en-US" sz="1600" spc="-1" strike="noStrike">
               <a:latin typeface="Arial"/>
             </a:endParaRPr>
           </a:p>
@@ -11886,7 +11970,7 @@
       </p:sp>
       <p:pic>
         <p:nvPicPr>
-          <p:cNvPr id="184" name="" descr=""/>
+          <p:cNvPr id="186" name="" descr=""/>
           <p:cNvPicPr/>
           <p:nvPr/>
         </p:nvPicPr>
@@ -11896,8 +11980,8 @@
         </p:blipFill>
         <p:spPr>
           <a:xfrm>
-            <a:off x="1013400" y="968760"/>
-            <a:ext cx="7974360" cy="4555800"/>
+            <a:off x="605520" y="1137960"/>
+            <a:ext cx="8930880" cy="3093480"/>
           </a:xfrm>
           <a:prstGeom prst="rect">
             <a:avLst/>
@@ -11939,7 +12023,7 @@
       </p:grpSpPr>
       <p:sp>
         <p:nvSpPr>
-          <p:cNvPr id="185" name="PlaceHolder 1"/>
+          <p:cNvPr id="187" name="PlaceHolder 1"/>
           <p:cNvSpPr>
             <a:spLocks noGrp="1"/>
           </p:cNvSpPr>
@@ -11985,7 +12069,7 @@
       </p:sp>
       <p:pic>
         <p:nvPicPr>
-          <p:cNvPr id="186" name="" descr=""/>
+          <p:cNvPr id="188" name="" descr=""/>
           <p:cNvPicPr/>
           <p:nvPr/>
         </p:nvPicPr>
@@ -12038,7 +12122,7 @@
       </p:grpSpPr>
       <p:sp>
         <p:nvSpPr>
-          <p:cNvPr id="187" name=""/>
+          <p:cNvPr id="189" name=""/>
           <p:cNvSpPr/>
           <p:nvPr/>
         </p:nvSpPr>
@@ -12064,7 +12148,7 @@
       </p:sp>
       <p:sp>
         <p:nvSpPr>
-          <p:cNvPr id="188" name="PlaceHolder 4"/>
+          <p:cNvPr id="190" name="PlaceHolder 4"/>
           <p:cNvSpPr/>
           <p:nvPr/>
         </p:nvSpPr>
@@ -12112,7 +12196,7 @@
       </p:sp>
       <p:sp>
         <p:nvSpPr>
-          <p:cNvPr id="189" name=""/>
+          <p:cNvPr id="191" name=""/>
           <p:cNvSpPr txBox="1"/>
           <p:nvPr/>
         </p:nvSpPr>
@@ -12210,7 +12294,7 @@
       </p:sp>
       <p:sp>
         <p:nvSpPr>
-          <p:cNvPr id="190" name=""/>
+          <p:cNvPr id="192" name=""/>
           <p:cNvSpPr txBox="1"/>
           <p:nvPr/>
         </p:nvSpPr>
@@ -12436,7 +12520,7 @@
       </p:grpSpPr>
       <p:pic>
         <p:nvPicPr>
-          <p:cNvPr id="191" name="" descr=""/>
+          <p:cNvPr id="193" name="" descr=""/>
           <p:cNvPicPr/>
           <p:nvPr/>
         </p:nvPicPr>
@@ -12459,7 +12543,7 @@
       </p:pic>
       <p:pic>
         <p:nvPicPr>
-          <p:cNvPr id="192" name="" descr=""/>
+          <p:cNvPr id="194" name="" descr=""/>
           <p:cNvPicPr/>
           <p:nvPr/>
         </p:nvPicPr>
@@ -12482,7 +12566,7 @@
       </p:pic>
       <p:sp>
         <p:nvSpPr>
-          <p:cNvPr id="193" name="PlaceHolder 11"/>
+          <p:cNvPr id="195" name="PlaceHolder 11"/>
           <p:cNvSpPr/>
           <p:nvPr/>
         </p:nvSpPr>
@@ -12530,7 +12614,7 @@
       </p:sp>
       <p:pic>
         <p:nvPicPr>
-          <p:cNvPr id="194" name="" descr=""/>
+          <p:cNvPr id="196" name="" descr=""/>
           <p:cNvPicPr/>
           <p:nvPr/>
         </p:nvPicPr>
@@ -12553,7 +12637,7 @@
       </p:pic>
       <p:sp>
         <p:nvSpPr>
-          <p:cNvPr id="195" name=""/>
+          <p:cNvPr id="197" name=""/>
           <p:cNvSpPr/>
           <p:nvPr/>
         </p:nvSpPr>
@@ -12631,7 +12715,7 @@
       </p:grpSpPr>
       <p:sp>
         <p:nvSpPr>
-          <p:cNvPr id="196" name=""/>
+          <p:cNvPr id="198" name=""/>
           <p:cNvSpPr/>
           <p:nvPr/>
         </p:nvSpPr>
@@ -12679,7 +12763,7 @@
       </p:sp>
       <p:sp>
         <p:nvSpPr>
-          <p:cNvPr id="197" name=""/>
+          <p:cNvPr id="199" name=""/>
           <p:cNvSpPr/>
           <p:nvPr/>
         </p:nvSpPr>
@@ -12727,7 +12811,7 @@
       </p:sp>
       <p:pic>
         <p:nvPicPr>
-          <p:cNvPr id="198" name="" descr=""/>
+          <p:cNvPr id="200" name="" descr=""/>
           <p:cNvPicPr/>
           <p:nvPr/>
         </p:nvPicPr>
@@ -12750,7 +12834,7 @@
       </p:pic>
       <p:sp>
         <p:nvSpPr>
-          <p:cNvPr id="199" name=""/>
+          <p:cNvPr id="201" name=""/>
           <p:cNvSpPr/>
           <p:nvPr/>
         </p:nvSpPr>

</xml_diff>